<commit_message>
a lot of change..
</commit_message>
<xml_diff>
--- a/images/图标.pptx
+++ b/images/图标.pptx
@@ -3712,13 +3712,13 @@
         </p:nvCxnSpPr>
         <p:spPr>
           <a:xfrm>
-            <a:off x="1407560" y="1910993"/>
-            <a:ext cx="0" cy="195209"/>
+            <a:off x="1407560" y="1685925"/>
+            <a:ext cx="0" cy="396000"/>
           </a:xfrm>
           <a:prstGeom prst="straightConnector1">
             <a:avLst/>
           </a:prstGeom>
-          <a:ln w="28575">
+          <a:ln w="63500">
             <a:tailEnd type="triangle"/>
           </a:ln>
         </p:spPr>
@@ -3753,13 +3753,13 @@
         </p:nvCxnSpPr>
         <p:spPr>
           <a:xfrm flipV="1">
-            <a:off x="1407560" y="2207231"/>
-            <a:ext cx="0" cy="195209"/>
+            <a:off x="1407560" y="2207232"/>
+            <a:ext cx="0" cy="396000"/>
           </a:xfrm>
           <a:prstGeom prst="straightConnector1">
             <a:avLst/>
           </a:prstGeom>
-          <a:ln w="28575">
+          <a:ln w="63500">
             <a:tailEnd type="triangle"/>
           </a:ln>
         </p:spPr>

</xml_diff>